<commit_message>
Clase 20 mayo 2024
</commit_message>
<xml_diff>
--- a/Docs/Modulo-III-Docs/JQueryVarios.pptx
+++ b/Docs/Modulo-III-Docs/JQueryVarios.pptx
@@ -10,6 +10,7 @@
     <p:sldId id="260" r:id="rId4"/>
     <p:sldId id="261" r:id="rId5"/>
     <p:sldId id="262" r:id="rId6"/>
+    <p:sldId id="263" r:id="rId7"/>
   </p:sldIdLst>
   <p:sldSz cx="12192000" cy="6858000"/>
   <p:notesSz cx="6858000" cy="9144000"/>
@@ -108,6 +109,11 @@
       </a:defRPr>
     </a:lvl9pPr>
   </p:defaultTextStyle>
+  <p:extLst>
+    <p:ext uri="{EFAFB233-063F-42B5-8137-9DF3F51BA10A}">
+      <p15:sldGuideLst xmlns:p15="http://schemas.microsoft.com/office/powerpoint/2012/main"/>
+    </p:ext>
+  </p:extLst>
 </p:presentation>
 </file>
 
@@ -4151,7 +4157,12 @@
             <p:ph idx="1"/>
           </p:nvPr>
         </p:nvSpPr>
-        <p:spPr/>
+        <p:spPr>
+          <a:xfrm>
+            <a:off x="838200" y="1825625"/>
+            <a:ext cx="10515600" cy="1380791"/>
+          </a:xfrm>
+        </p:spPr>
         <p:txBody>
           <a:bodyPr/>
           <a:lstStyle/>
@@ -4216,6 +4227,373 @@
     <p:extLst>
       <p:ext uri="{BB962C8B-B14F-4D97-AF65-F5344CB8AC3E}">
         <p14:creationId xmlns:p14="http://schemas.microsoft.com/office/powerpoint/2010/main" val="3702314460"/>
+      </p:ext>
+    </p:extLst>
+  </p:cSld>
+  <p:clrMapOvr>
+    <a:masterClrMapping/>
+  </p:clrMapOvr>
+</p:sld>
+</file>
+
+<file path=ppt/slides/slide6.xml><?xml version="1.0" encoding="utf-8"?>
+<p:sld xmlns:a="http://schemas.openxmlformats.org/drawingml/2006/main" xmlns:r="http://schemas.openxmlformats.org/officeDocument/2006/relationships" xmlns:p="http://schemas.openxmlformats.org/presentationml/2006/main">
+  <p:cSld>
+    <p:bg>
+      <p:bgPr>
+        <a:solidFill>
+          <a:schemeClr val="bg1"/>
+        </a:solidFill>
+        <a:effectLst/>
+      </p:bgPr>
+    </p:bg>
+    <p:spTree>
+      <p:nvGrpSpPr>
+        <p:cNvPr id="1" name=""/>
+        <p:cNvGrpSpPr/>
+        <p:nvPr/>
+      </p:nvGrpSpPr>
+      <p:grpSpPr>
+        <a:xfrm>
+          <a:off x="0" y="0"/>
+          <a:ext cx="0" cy="0"/>
+          <a:chOff x="0" y="0"/>
+          <a:chExt cx="0" cy="0"/>
+        </a:xfrm>
+      </p:grpSpPr>
+      <p:sp useBgFill="1">
+        <p:nvSpPr>
+          <p:cNvPr id="9" name="Rectangle 8">
+            <a:extLst>
+              <a:ext uri="{FF2B5EF4-FFF2-40B4-BE49-F238E27FC236}">
+                <a16:creationId xmlns:a16="http://schemas.microsoft.com/office/drawing/2014/main" id="{AB8C311F-7253-4AED-9701-7FC0708C41C7}"/>
+              </a:ext>
+              <a:ext uri="{C183D7F6-B498-43B3-948B-1728B52AA6E4}">
+                <adec:decorative xmlns:adec="http://schemas.microsoft.com/office/drawing/2017/decorative" val="1"/>
+              </a:ext>
+            </a:extLst>
+          </p:cNvPr>
+          <p:cNvSpPr>
+            <a:spLocks noGrp="1" noRot="1" noChangeAspect="1" noMove="1" noResize="1" noEditPoints="1" noAdjustHandles="1" noChangeArrowheads="1" noChangeShapeType="1" noTextEdit="1"/>
+          </p:cNvSpPr>
+          <p:nvPr>
+            <p:extLst>
+              <p:ext uri="{386F3935-93C4-4BCD-93E2-E3B085C9AB24}">
+                <p16:designElem xmlns:p16="http://schemas.microsoft.com/office/powerpoint/2015/main" val="1"/>
+              </p:ext>
+            </p:extLst>
+          </p:nvPr>
+        </p:nvSpPr>
+        <p:spPr>
+          <a:xfrm>
+            <a:off x="0" y="0"/>
+            <a:ext cx="12192000" cy="6858000"/>
+          </a:xfrm>
+          <a:prstGeom prst="rect">
+            <a:avLst/>
+          </a:prstGeom>
+          <a:ln w="12700" cap="flat" cmpd="sng" algn="ctr">
+            <a:noFill/>
+            <a:prstDash val="solid"/>
+            <a:miter lim="800000"/>
+          </a:ln>
+          <a:effectLst/>
+          <a:extLst>
+            <a:ext uri="{91240B29-F687-4F45-9708-019B960494DF}">
+              <a14:hiddenLine xmlns:a14="http://schemas.microsoft.com/office/drawing/2010/main" w="12700" cap="flat" cmpd="sng" algn="ctr">
+                <a:solidFill>
+                  <a:schemeClr val="accent1">
+                    <a:shade val="50000"/>
+                  </a:schemeClr>
+                </a:solidFill>
+                <a:prstDash val="solid"/>
+                <a:miter lim="800000"/>
+              </a14:hiddenLine>
+            </a:ext>
+          </a:extLst>
+        </p:spPr>
+        <p:style>
+          <a:lnRef idx="2">
+            <a:schemeClr val="accent1">
+              <a:shade val="50000"/>
+            </a:schemeClr>
+          </a:lnRef>
+          <a:fillRef idx="1">
+            <a:schemeClr val="accent1"/>
+          </a:fillRef>
+          <a:effectRef idx="0">
+            <a:schemeClr val="accent1"/>
+          </a:effectRef>
+          <a:fontRef idx="minor">
+            <a:schemeClr val="lt1"/>
+          </a:fontRef>
+        </p:style>
+        <p:txBody>
+          <a:bodyPr rtlCol="0" anchor="ctr"/>
+          <a:lstStyle/>
+          <a:p>
+            <a:pPr algn="ctr"/>
+            <a:endParaRPr lang="en-US"/>
+          </a:p>
+        </p:txBody>
+      </p:sp>
+      <p:sp>
+        <p:nvSpPr>
+          <p:cNvPr id="11" name="Rectangle 10">
+            <a:extLst>
+              <a:ext uri="{FF2B5EF4-FFF2-40B4-BE49-F238E27FC236}">
+                <a16:creationId xmlns:a16="http://schemas.microsoft.com/office/drawing/2014/main" id="{E2384209-CB15-4CDF-9D31-C44FD9A3F20D}"/>
+              </a:ext>
+              <a:ext uri="{C183D7F6-B498-43B3-948B-1728B52AA6E4}">
+                <adec:decorative xmlns:adec="http://schemas.microsoft.com/office/drawing/2017/decorative" val="1"/>
+              </a:ext>
+            </a:extLst>
+          </p:cNvPr>
+          <p:cNvSpPr>
+            <a:spLocks noGrp="1" noRot="1" noChangeAspect="1" noMove="1" noResize="1" noEditPoints="1" noAdjustHandles="1" noChangeArrowheads="1" noChangeShapeType="1" noTextEdit="1"/>
+          </p:cNvSpPr>
+          <p:nvPr>
+            <p:extLst>
+              <p:ext uri="{386F3935-93C4-4BCD-93E2-E3B085C9AB24}">
+                <p16:designElem xmlns:p16="http://schemas.microsoft.com/office/powerpoint/2015/main" val="1"/>
+              </p:ext>
+            </p:extLst>
+          </p:nvPr>
+        </p:nvSpPr>
+        <p:spPr>
+          <a:xfrm rot="16200000" flipH="1">
+            <a:off x="2666617" y="-2666188"/>
+            <a:ext cx="6858000" cy="12191233"/>
+          </a:xfrm>
+          <a:prstGeom prst="rect">
+            <a:avLst/>
+          </a:prstGeom>
+          <a:gradFill>
+            <a:gsLst>
+              <a:gs pos="8000">
+                <a:schemeClr val="accent1"/>
+              </a:gs>
+              <a:gs pos="100000">
+                <a:schemeClr val="accent1">
+                  <a:lumMod val="50000"/>
+                </a:schemeClr>
+              </a:gs>
+            </a:gsLst>
+            <a:lin ang="12000000" scaled="0"/>
+          </a:gradFill>
+          <a:ln>
+            <a:noFill/>
+          </a:ln>
+        </p:spPr>
+        <p:style>
+          <a:lnRef idx="2">
+            <a:schemeClr val="accent1">
+              <a:shade val="50000"/>
+            </a:schemeClr>
+          </a:lnRef>
+          <a:fillRef idx="1">
+            <a:schemeClr val="accent1"/>
+          </a:fillRef>
+          <a:effectRef idx="0">
+            <a:schemeClr val="accent1"/>
+          </a:effectRef>
+          <a:fontRef idx="minor">
+            <a:schemeClr val="lt1"/>
+          </a:fontRef>
+        </p:style>
+        <p:txBody>
+          <a:bodyPr rtlCol="0" anchor="ctr"/>
+          <a:lstStyle/>
+          <a:p>
+            <a:pPr algn="ctr"/>
+            <a:endParaRPr lang="en-US"/>
+          </a:p>
+        </p:txBody>
+      </p:sp>
+      <p:sp>
+        <p:nvSpPr>
+          <p:cNvPr id="13" name="Rectangle 12">
+            <a:extLst>
+              <a:ext uri="{FF2B5EF4-FFF2-40B4-BE49-F238E27FC236}">
+                <a16:creationId xmlns:a16="http://schemas.microsoft.com/office/drawing/2014/main" id="{2633B3B5-CC90-43F0-8714-D31D1F3F0209}"/>
+              </a:ext>
+              <a:ext uri="{C183D7F6-B498-43B3-948B-1728B52AA6E4}">
+                <adec:decorative xmlns:adec="http://schemas.microsoft.com/office/drawing/2017/decorative" val="1"/>
+              </a:ext>
+            </a:extLst>
+          </p:cNvPr>
+          <p:cNvSpPr>
+            <a:spLocks noGrp="1" noRot="1" noChangeAspect="1" noMove="1" noResize="1" noEditPoints="1" noAdjustHandles="1" noChangeArrowheads="1" noChangeShapeType="1" noTextEdit="1"/>
+          </p:cNvSpPr>
+          <p:nvPr>
+            <p:extLst>
+              <p:ext uri="{386F3935-93C4-4BCD-93E2-E3B085C9AB24}">
+                <p16:designElem xmlns:p16="http://schemas.microsoft.com/office/powerpoint/2015/main" val="1"/>
+              </p:ext>
+            </p:extLst>
+          </p:nvPr>
+        </p:nvSpPr>
+        <p:spPr>
+          <a:xfrm rot="10800000" flipH="1">
+            <a:off x="-2311" y="0"/>
+            <a:ext cx="9070846" cy="6857572"/>
+          </a:xfrm>
+          <a:prstGeom prst="rect">
+            <a:avLst/>
+          </a:prstGeom>
+          <a:gradFill>
+            <a:gsLst>
+              <a:gs pos="8000">
+                <a:srgbClr val="000000">
+                  <a:alpha val="52000"/>
+                </a:srgbClr>
+              </a:gs>
+              <a:gs pos="100000">
+                <a:schemeClr val="accent1"/>
+              </a:gs>
+            </a:gsLst>
+            <a:lin ang="4800000" scaled="0"/>
+          </a:gradFill>
+          <a:ln>
+            <a:noFill/>
+          </a:ln>
+        </p:spPr>
+        <p:style>
+          <a:lnRef idx="2">
+            <a:schemeClr val="accent1">
+              <a:shade val="50000"/>
+            </a:schemeClr>
+          </a:lnRef>
+          <a:fillRef idx="1">
+            <a:schemeClr val="accent1"/>
+          </a:fillRef>
+          <a:effectRef idx="0">
+            <a:schemeClr val="accent1"/>
+          </a:effectRef>
+          <a:fontRef idx="minor">
+            <a:schemeClr val="lt1"/>
+          </a:fontRef>
+        </p:style>
+        <p:txBody>
+          <a:bodyPr rtlCol="0" anchor="ctr"/>
+          <a:lstStyle/>
+          <a:p>
+            <a:pPr algn="ctr"/>
+            <a:endParaRPr lang="en-US"/>
+          </a:p>
+        </p:txBody>
+      </p:sp>
+      <p:sp>
+        <p:nvSpPr>
+          <p:cNvPr id="15" name="Rectangle 14">
+            <a:extLst>
+              <a:ext uri="{FF2B5EF4-FFF2-40B4-BE49-F238E27FC236}">
+                <a16:creationId xmlns:a16="http://schemas.microsoft.com/office/drawing/2014/main" id="{A8D57A06-A426-446D-B02C-A2DC6B62E45E}"/>
+              </a:ext>
+              <a:ext uri="{C183D7F6-B498-43B3-948B-1728B52AA6E4}">
+                <adec:decorative xmlns:adec="http://schemas.microsoft.com/office/drawing/2017/decorative" val="1"/>
+              </a:ext>
+            </a:extLst>
+          </p:cNvPr>
+          <p:cNvSpPr>
+            <a:spLocks noGrp="1" noRot="1" noChangeAspect="1" noMove="1" noResize="1" noEditPoints="1" noAdjustHandles="1" noChangeArrowheads="1" noChangeShapeType="1" noTextEdit="1"/>
+          </p:cNvSpPr>
+          <p:nvPr>
+            <p:extLst>
+              <p:ext uri="{386F3935-93C4-4BCD-93E2-E3B085C9AB24}">
+                <p16:designElem xmlns:p16="http://schemas.microsoft.com/office/powerpoint/2015/main" val="1"/>
+              </p:ext>
+            </p:extLst>
+          </p:nvPr>
+        </p:nvSpPr>
+        <p:spPr>
+          <a:xfrm rot="16200000" flipH="1">
+            <a:off x="3649491" y="-1685840"/>
+            <a:ext cx="4894564" cy="12193546"/>
+          </a:xfrm>
+          <a:prstGeom prst="rect">
+            <a:avLst/>
+          </a:prstGeom>
+          <a:gradFill>
+            <a:gsLst>
+              <a:gs pos="0">
+                <a:schemeClr val="accent5">
+                  <a:lumMod val="60000"/>
+                  <a:lumOff val="40000"/>
+                  <a:alpha val="0"/>
+                </a:schemeClr>
+              </a:gs>
+              <a:gs pos="100000">
+                <a:srgbClr val="000000">
+                  <a:alpha val="46000"/>
+                </a:srgbClr>
+              </a:gs>
+            </a:gsLst>
+            <a:lin ang="1200000" scaled="0"/>
+          </a:gradFill>
+          <a:ln>
+            <a:noFill/>
+          </a:ln>
+        </p:spPr>
+        <p:style>
+          <a:lnRef idx="2">
+            <a:schemeClr val="accent1">
+              <a:shade val="50000"/>
+            </a:schemeClr>
+          </a:lnRef>
+          <a:fillRef idx="1">
+            <a:schemeClr val="accent1"/>
+          </a:fillRef>
+          <a:effectRef idx="0">
+            <a:schemeClr val="accent1"/>
+          </a:effectRef>
+          <a:fontRef idx="minor">
+            <a:schemeClr val="lt1"/>
+          </a:fontRef>
+        </p:style>
+        <p:txBody>
+          <a:bodyPr rtlCol="0" anchor="ctr"/>
+          <a:lstStyle/>
+          <a:p>
+            <a:pPr algn="ctr"/>
+            <a:endParaRPr lang="en-US"/>
+          </a:p>
+        </p:txBody>
+      </p:sp>
+      <p:pic>
+        <p:nvPicPr>
+          <p:cNvPr id="4" name="Picture 15" descr="Diagram&#10;&#10;Description automatically generated">
+            <a:extLst>
+              <a:ext uri="{FF2B5EF4-FFF2-40B4-BE49-F238E27FC236}">
+                <a16:creationId xmlns:a16="http://schemas.microsoft.com/office/drawing/2014/main" id="{22E7D0D7-21B2-B0F6-B3FA-2DD2F74B9C73}"/>
+              </a:ext>
+            </a:extLst>
+          </p:cNvPr>
+          <p:cNvPicPr>
+            <a:picLocks noChangeAspect="1"/>
+          </p:cNvPicPr>
+          <p:nvPr/>
+        </p:nvPicPr>
+        <p:blipFill>
+          <a:blip r:embed="rId2"/>
+          <a:stretch>
+            <a:fillRect/>
+          </a:stretch>
+        </p:blipFill>
+        <p:spPr>
+          <a:xfrm>
+            <a:off x="1643865" y="457200"/>
+            <a:ext cx="8904270" cy="5943600"/>
+          </a:xfrm>
+          <a:prstGeom prst="rect">
+            <a:avLst/>
+          </a:prstGeom>
+        </p:spPr>
+      </p:pic>
+    </p:spTree>
+    <p:extLst>
+      <p:ext uri="{BB962C8B-B14F-4D97-AF65-F5344CB8AC3E}">
+        <p14:creationId xmlns:p14="http://schemas.microsoft.com/office/powerpoint/2010/main" val="1364978473"/>
       </p:ext>
     </p:extLst>
   </p:cSld>

</xml_diff>